<commit_message>
added slides on simpson's paradox
</commit_message>
<xml_diff>
--- a/Slides_6.pptx
+++ b/Slides_6.pptx
@@ -6,6 +6,10 @@
   </p:sldMasterIdLst>
   <p:sldIdLst>
     <p:sldId id="257" r:id="rId2"/>
+    <p:sldId id="258" r:id="rId3"/>
+    <p:sldId id="259" r:id="rId4"/>
+    <p:sldId id="260" r:id="rId5"/>
+    <p:sldId id="261" r:id="rId6"/>
   </p:sldIdLst>
   <p:sldSz cx="12192000" cy="6858000"/>
   <p:notesSz cx="6858000" cy="9144000"/>
@@ -3408,6 +3412,552 @@
 </p:sld>
 </file>
 
+<file path=ppt/slides/slide2.xml><?xml version="1.0" encoding="utf-8"?>
+<p:sld xmlns:a="http://schemas.openxmlformats.org/drawingml/2006/main" xmlns:r="http://schemas.openxmlformats.org/officeDocument/2006/relationships" xmlns:p="http://schemas.openxmlformats.org/presentationml/2006/main">
+  <p:cSld>
+    <p:spTree>
+      <p:nvGrpSpPr>
+        <p:cNvPr id="1" name=""/>
+        <p:cNvGrpSpPr/>
+        <p:nvPr/>
+      </p:nvGrpSpPr>
+      <p:grpSpPr>
+        <a:xfrm>
+          <a:off x="0" y="0"/>
+          <a:ext cx="0" cy="0"/>
+          <a:chOff x="0" y="0"/>
+          <a:chExt cx="0" cy="0"/>
+        </a:xfrm>
+      </p:grpSpPr>
+      <p:sp>
+        <p:nvSpPr>
+          <p:cNvPr id="2" name="Title 1">
+            <a:extLst>
+              <a:ext uri="{FF2B5EF4-FFF2-40B4-BE49-F238E27FC236}">
+                <a16:creationId xmlns:a16="http://schemas.microsoft.com/office/drawing/2014/main" id="{7A40177F-BCCD-7BE2-DBFD-188813EADB13}"/>
+              </a:ext>
+            </a:extLst>
+          </p:cNvPr>
+          <p:cNvSpPr>
+            <a:spLocks noGrp="1"/>
+          </p:cNvSpPr>
+          <p:nvPr>
+            <p:ph type="title"/>
+          </p:nvPr>
+        </p:nvSpPr>
+        <p:spPr/>
+        <p:txBody>
+          <a:bodyPr/>
+          <a:lstStyle/>
+          <a:p>
+            <a:r>
+              <a:rPr lang="en-US" dirty="0"/>
+              <a:t>Simpson’s Paradox</a:t>
+            </a:r>
+          </a:p>
+        </p:txBody>
+      </p:sp>
+      <p:pic>
+        <p:nvPicPr>
+          <p:cNvPr id="13" name="Graphic 12">
+            <a:extLst>
+              <a:ext uri="{FF2B5EF4-FFF2-40B4-BE49-F238E27FC236}">
+                <a16:creationId xmlns:a16="http://schemas.microsoft.com/office/drawing/2014/main" id="{294D540C-B721-CD7B-337E-EF6259EA489D}"/>
+              </a:ext>
+            </a:extLst>
+          </p:cNvPr>
+          <p:cNvPicPr>
+            <a:picLocks noChangeAspect="1"/>
+          </p:cNvPicPr>
+          <p:nvPr/>
+        </p:nvPicPr>
+        <p:blipFill>
+          <a:blip r:embed="rId2">
+            <a:extLst>
+              <a:ext uri="{28A0092B-C50C-407E-A947-70E740481C1C}">
+                <a14:useLocalDpi xmlns:a14="http://schemas.microsoft.com/office/drawing/2010/main" val="0"/>
+              </a:ext>
+              <a:ext uri="{96DAC541-7B7A-43D3-8B79-37D633B846F1}">
+                <asvg:svgBlip xmlns:asvg="http://schemas.microsoft.com/office/drawing/2016/SVG/main" r:embed="rId3"/>
+              </a:ext>
+            </a:extLst>
+          </a:blip>
+          <a:stretch>
+            <a:fillRect/>
+          </a:stretch>
+        </p:blipFill>
+        <p:spPr>
+          <a:xfrm>
+            <a:off x="3171825" y="1690688"/>
+            <a:ext cx="5848350" cy="4391025"/>
+          </a:xfrm>
+          <a:prstGeom prst="rect">
+            <a:avLst/>
+          </a:prstGeom>
+        </p:spPr>
+      </p:pic>
+    </p:spTree>
+    <p:extLst>
+      <p:ext uri="{BB962C8B-B14F-4D97-AF65-F5344CB8AC3E}">
+        <p14:creationId xmlns:p14="http://schemas.microsoft.com/office/powerpoint/2010/main" val="3493813268"/>
+      </p:ext>
+    </p:extLst>
+  </p:cSld>
+  <p:clrMapOvr>
+    <a:masterClrMapping/>
+  </p:clrMapOvr>
+</p:sld>
+</file>
+
+<file path=ppt/slides/slide3.xml><?xml version="1.0" encoding="utf-8"?>
+<p:sld xmlns:a="http://schemas.openxmlformats.org/drawingml/2006/main" xmlns:r="http://schemas.openxmlformats.org/officeDocument/2006/relationships" xmlns:p="http://schemas.openxmlformats.org/presentationml/2006/main">
+  <p:cSld>
+    <p:spTree>
+      <p:nvGrpSpPr>
+        <p:cNvPr id="1" name=""/>
+        <p:cNvGrpSpPr/>
+        <p:nvPr/>
+      </p:nvGrpSpPr>
+      <p:grpSpPr>
+        <a:xfrm>
+          <a:off x="0" y="0"/>
+          <a:ext cx="0" cy="0"/>
+          <a:chOff x="0" y="0"/>
+          <a:chExt cx="0" cy="0"/>
+        </a:xfrm>
+      </p:grpSpPr>
+      <p:sp>
+        <p:nvSpPr>
+          <p:cNvPr id="2" name="Title 1">
+            <a:extLst>
+              <a:ext uri="{FF2B5EF4-FFF2-40B4-BE49-F238E27FC236}">
+                <a16:creationId xmlns:a16="http://schemas.microsoft.com/office/drawing/2014/main" id="{7A40177F-BCCD-7BE2-DBFD-188813EADB13}"/>
+              </a:ext>
+            </a:extLst>
+          </p:cNvPr>
+          <p:cNvSpPr>
+            <a:spLocks noGrp="1"/>
+          </p:cNvSpPr>
+          <p:nvPr>
+            <p:ph type="title"/>
+          </p:nvPr>
+        </p:nvSpPr>
+        <p:spPr/>
+        <p:txBody>
+          <a:bodyPr/>
+          <a:lstStyle/>
+          <a:p>
+            <a:r>
+              <a:rPr lang="en-US" dirty="0"/>
+              <a:t>Simpson’s Paradox</a:t>
+            </a:r>
+          </a:p>
+        </p:txBody>
+      </p:sp>
+      <p:pic>
+        <p:nvPicPr>
+          <p:cNvPr id="4" name="Graphic 3">
+            <a:extLst>
+              <a:ext uri="{FF2B5EF4-FFF2-40B4-BE49-F238E27FC236}">
+                <a16:creationId xmlns:a16="http://schemas.microsoft.com/office/drawing/2014/main" id="{3A2B0B33-5AE1-0A11-A92B-1910013B3859}"/>
+              </a:ext>
+            </a:extLst>
+          </p:cNvPr>
+          <p:cNvPicPr>
+            <a:picLocks noChangeAspect="1"/>
+          </p:cNvPicPr>
+          <p:nvPr/>
+        </p:nvPicPr>
+        <p:blipFill>
+          <a:blip r:embed="rId2">
+            <a:extLst>
+              <a:ext uri="{28A0092B-C50C-407E-A947-70E740481C1C}">
+                <a14:useLocalDpi xmlns:a14="http://schemas.microsoft.com/office/drawing/2010/main" val="0"/>
+              </a:ext>
+              <a:ext uri="{96DAC541-7B7A-43D3-8B79-37D633B846F1}">
+                <asvg:svgBlip xmlns:asvg="http://schemas.microsoft.com/office/drawing/2016/SVG/main" r:embed="rId3"/>
+              </a:ext>
+            </a:extLst>
+          </a:blip>
+          <a:stretch>
+            <a:fillRect/>
+          </a:stretch>
+        </p:blipFill>
+        <p:spPr>
+          <a:xfrm>
+            <a:off x="3171825" y="1690688"/>
+            <a:ext cx="5848350" cy="4391025"/>
+          </a:xfrm>
+          <a:prstGeom prst="rect">
+            <a:avLst/>
+          </a:prstGeom>
+        </p:spPr>
+      </p:pic>
+    </p:spTree>
+    <p:extLst>
+      <p:ext uri="{BB962C8B-B14F-4D97-AF65-F5344CB8AC3E}">
+        <p14:creationId xmlns:p14="http://schemas.microsoft.com/office/powerpoint/2010/main" val="3490033838"/>
+      </p:ext>
+    </p:extLst>
+  </p:cSld>
+  <p:clrMapOvr>
+    <a:masterClrMapping/>
+  </p:clrMapOvr>
+</p:sld>
+</file>
+
+<file path=ppt/slides/slide4.xml><?xml version="1.0" encoding="utf-8"?>
+<p:sld xmlns:a="http://schemas.openxmlformats.org/drawingml/2006/main" xmlns:r="http://schemas.openxmlformats.org/officeDocument/2006/relationships" xmlns:p="http://schemas.openxmlformats.org/presentationml/2006/main">
+  <p:cSld>
+    <p:spTree>
+      <p:nvGrpSpPr>
+        <p:cNvPr id="1" name=""/>
+        <p:cNvGrpSpPr/>
+        <p:nvPr/>
+      </p:nvGrpSpPr>
+      <p:grpSpPr>
+        <a:xfrm>
+          <a:off x="0" y="0"/>
+          <a:ext cx="0" cy="0"/>
+          <a:chOff x="0" y="0"/>
+          <a:chExt cx="0" cy="0"/>
+        </a:xfrm>
+      </p:grpSpPr>
+      <p:sp>
+        <p:nvSpPr>
+          <p:cNvPr id="2" name="Title 1">
+            <a:extLst>
+              <a:ext uri="{FF2B5EF4-FFF2-40B4-BE49-F238E27FC236}">
+                <a16:creationId xmlns:a16="http://schemas.microsoft.com/office/drawing/2014/main" id="{7A40177F-BCCD-7BE2-DBFD-188813EADB13}"/>
+              </a:ext>
+            </a:extLst>
+          </p:cNvPr>
+          <p:cNvSpPr>
+            <a:spLocks noGrp="1"/>
+          </p:cNvSpPr>
+          <p:nvPr>
+            <p:ph type="title"/>
+          </p:nvPr>
+        </p:nvSpPr>
+        <p:spPr/>
+        <p:txBody>
+          <a:bodyPr/>
+          <a:lstStyle/>
+          <a:p>
+            <a:r>
+              <a:rPr lang="en-US" dirty="0"/>
+              <a:t>Simpson’s Paradox</a:t>
+            </a:r>
+          </a:p>
+        </p:txBody>
+      </p:sp>
+      <p:pic>
+        <p:nvPicPr>
+          <p:cNvPr id="4" name="Graphic 3">
+            <a:extLst>
+              <a:ext uri="{FF2B5EF4-FFF2-40B4-BE49-F238E27FC236}">
+                <a16:creationId xmlns:a16="http://schemas.microsoft.com/office/drawing/2014/main" id="{0C59102A-F857-96FE-9AC8-C0E1F6EAB088}"/>
+              </a:ext>
+            </a:extLst>
+          </p:cNvPr>
+          <p:cNvPicPr>
+            <a:picLocks noChangeAspect="1"/>
+          </p:cNvPicPr>
+          <p:nvPr/>
+        </p:nvPicPr>
+        <p:blipFill>
+          <a:blip r:embed="rId2">
+            <a:extLst>
+              <a:ext uri="{28A0092B-C50C-407E-A947-70E740481C1C}">
+                <a14:useLocalDpi xmlns:a14="http://schemas.microsoft.com/office/drawing/2010/main" val="0"/>
+              </a:ext>
+              <a:ext uri="{96DAC541-7B7A-43D3-8B79-37D633B846F1}">
+                <asvg:svgBlip xmlns:asvg="http://schemas.microsoft.com/office/drawing/2016/SVG/main" r:embed="rId3"/>
+              </a:ext>
+            </a:extLst>
+          </a:blip>
+          <a:stretch>
+            <a:fillRect/>
+          </a:stretch>
+        </p:blipFill>
+        <p:spPr>
+          <a:xfrm>
+            <a:off x="3171825" y="1690688"/>
+            <a:ext cx="5848350" cy="4391025"/>
+          </a:xfrm>
+          <a:prstGeom prst="rect">
+            <a:avLst/>
+          </a:prstGeom>
+        </p:spPr>
+      </p:pic>
+    </p:spTree>
+    <p:extLst>
+      <p:ext uri="{BB962C8B-B14F-4D97-AF65-F5344CB8AC3E}">
+        <p14:creationId xmlns:p14="http://schemas.microsoft.com/office/powerpoint/2010/main" val="3372273435"/>
+      </p:ext>
+    </p:extLst>
+  </p:cSld>
+  <p:clrMapOvr>
+    <a:masterClrMapping/>
+  </p:clrMapOvr>
+</p:sld>
+</file>
+
+<file path=ppt/slides/slide5.xml><?xml version="1.0" encoding="utf-8"?>
+<p:sld xmlns:a="http://schemas.openxmlformats.org/drawingml/2006/main" xmlns:r="http://schemas.openxmlformats.org/officeDocument/2006/relationships" xmlns:p="http://schemas.openxmlformats.org/presentationml/2006/main">
+  <p:cSld>
+    <p:spTree>
+      <p:nvGrpSpPr>
+        <p:cNvPr id="1" name=""/>
+        <p:cNvGrpSpPr/>
+        <p:nvPr/>
+      </p:nvGrpSpPr>
+      <p:grpSpPr>
+        <a:xfrm>
+          <a:off x="0" y="0"/>
+          <a:ext cx="0" cy="0"/>
+          <a:chOff x="0" y="0"/>
+          <a:chExt cx="0" cy="0"/>
+        </a:xfrm>
+      </p:grpSpPr>
+      <p:sp>
+        <p:nvSpPr>
+          <p:cNvPr id="2" name="Title 1">
+            <a:extLst>
+              <a:ext uri="{FF2B5EF4-FFF2-40B4-BE49-F238E27FC236}">
+                <a16:creationId xmlns:a16="http://schemas.microsoft.com/office/drawing/2014/main" id="{7A40177F-BCCD-7BE2-DBFD-188813EADB13}"/>
+              </a:ext>
+            </a:extLst>
+          </p:cNvPr>
+          <p:cNvSpPr>
+            <a:spLocks noGrp="1"/>
+          </p:cNvSpPr>
+          <p:nvPr>
+            <p:ph type="title"/>
+          </p:nvPr>
+        </p:nvSpPr>
+        <p:spPr/>
+        <p:txBody>
+          <a:bodyPr/>
+          <a:lstStyle/>
+          <a:p>
+            <a:r>
+              <a:rPr lang="en-US" dirty="0"/>
+              <a:t>Simpson’s Paradox</a:t>
+            </a:r>
+          </a:p>
+        </p:txBody>
+      </p:sp>
+      <p:pic>
+        <p:nvPicPr>
+          <p:cNvPr id="6" name="Graphic 5">
+            <a:extLst>
+              <a:ext uri="{FF2B5EF4-FFF2-40B4-BE49-F238E27FC236}">
+                <a16:creationId xmlns:a16="http://schemas.microsoft.com/office/drawing/2014/main" id="{DDD3B794-29BA-4429-CB44-1FD07C396B12}"/>
+              </a:ext>
+            </a:extLst>
+          </p:cNvPr>
+          <p:cNvPicPr>
+            <a:picLocks noChangeAspect="1"/>
+          </p:cNvPicPr>
+          <p:nvPr/>
+        </p:nvPicPr>
+        <p:blipFill>
+          <a:blip r:embed="rId2">
+            <a:extLst>
+              <a:ext uri="{28A0092B-C50C-407E-A947-70E740481C1C}">
+                <a14:useLocalDpi xmlns:a14="http://schemas.microsoft.com/office/drawing/2010/main" val="0"/>
+              </a:ext>
+              <a:ext uri="{96DAC541-7B7A-43D3-8B79-37D633B846F1}">
+                <asvg:svgBlip xmlns:asvg="http://schemas.microsoft.com/office/drawing/2016/SVG/main" r:embed="rId3"/>
+              </a:ext>
+            </a:extLst>
+          </a:blip>
+          <a:stretch>
+            <a:fillRect/>
+          </a:stretch>
+        </p:blipFill>
+        <p:spPr>
+          <a:xfrm>
+            <a:off x="2443162" y="1690688"/>
+            <a:ext cx="7305675" cy="4448175"/>
+          </a:xfrm>
+          <a:prstGeom prst="rect">
+            <a:avLst/>
+          </a:prstGeom>
+        </p:spPr>
+      </p:pic>
+      <mc:AlternateContent xmlns:mc="http://schemas.openxmlformats.org/markup-compatibility/2006">
+        <mc:Choice xmlns:a14="http://schemas.microsoft.com/office/drawing/2010/main" Requires="a14">
+          <p:sp>
+            <p:nvSpPr>
+              <p:cNvPr id="7" name="TextBox 6">
+                <a:extLst>
+                  <a:ext uri="{FF2B5EF4-FFF2-40B4-BE49-F238E27FC236}">
+                    <a16:creationId xmlns:a16="http://schemas.microsoft.com/office/drawing/2014/main" id="{EB8A59D7-54AE-0350-D906-6E9F85B93FAC}"/>
+                  </a:ext>
+                </a:extLst>
+              </p:cNvPr>
+              <p:cNvSpPr txBox="1"/>
+              <p:nvPr/>
+            </p:nvSpPr>
+            <p:spPr>
+              <a:xfrm>
+                <a:off x="4733735" y="6138863"/>
+                <a:ext cx="2724527" cy="400110"/>
+              </a:xfrm>
+              <a:prstGeom prst="rect">
+                <a:avLst/>
+              </a:prstGeom>
+              <a:noFill/>
+            </p:spPr>
+            <p:txBody>
+              <a:bodyPr wrap="none" rtlCol="0">
+                <a:spAutoFit/>
+              </a:bodyPr>
+              <a:lstStyle/>
+              <a:p>
+                <a14:m>
+                  <m:oMathPara xmlns:m="http://schemas.openxmlformats.org/officeDocument/2006/math">
+                    <m:oMathParaPr>
+                      <m:jc m:val="centerGroup"/>
+                    </m:oMathParaPr>
+                    <m:oMath xmlns:m="http://schemas.openxmlformats.org/officeDocument/2006/math">
+                      <m:r>
+                        <a:rPr lang="en-US" sz="2000" i="1" smtClean="0">
+                          <a:solidFill>
+                            <a:schemeClr val="tx1"/>
+                          </a:solidFill>
+                          <a:latin typeface="Cambria Math" panose="02040503050406030204" pitchFamily="18" charset="0"/>
+                        </a:rPr>
+                        <m:t>𝑦</m:t>
+                      </m:r>
+                      <m:r>
+                        <a:rPr lang="en-US" sz="2000" i="1" smtClean="0">
+                          <a:solidFill>
+                            <a:schemeClr val="tx1"/>
+                          </a:solidFill>
+                          <a:latin typeface="Cambria Math" panose="02040503050406030204" pitchFamily="18" charset="0"/>
+                        </a:rPr>
+                        <m:t> = 1.0868</m:t>
+                      </m:r>
+                      <m:r>
+                        <a:rPr lang="en-US" sz="2000" i="1" smtClean="0">
+                          <a:solidFill>
+                            <a:schemeClr val="tx1"/>
+                          </a:solidFill>
+                          <a:latin typeface="Cambria Math" panose="02040503050406030204" pitchFamily="18" charset="0"/>
+                        </a:rPr>
+                        <m:t>𝑥</m:t>
+                      </m:r>
+                      <m:r>
+                        <a:rPr lang="en-US" sz="2000" b="0" i="1" smtClean="0">
+                          <a:solidFill>
+                            <a:schemeClr val="tx1"/>
+                          </a:solidFill>
+                          <a:latin typeface="Cambria Math" panose="02040503050406030204" pitchFamily="18" charset="0"/>
+                        </a:rPr>
+                        <m:t> </m:t>
+                      </m:r>
+                      <m:r>
+                        <a:rPr lang="en-US" sz="2000" i="1" smtClean="0">
+                          <a:solidFill>
+                            <a:schemeClr val="tx1"/>
+                          </a:solidFill>
+                          <a:latin typeface="Cambria Math" panose="02040503050406030204" pitchFamily="18" charset="0"/>
+                        </a:rPr>
+                        <m:t>-</m:t>
+                      </m:r>
+                      <m:r>
+                        <a:rPr lang="en-US" sz="2000" b="0" i="1" smtClean="0">
+                          <a:solidFill>
+                            <a:schemeClr val="tx1"/>
+                          </a:solidFill>
+                          <a:latin typeface="Cambria Math" panose="02040503050406030204" pitchFamily="18" charset="0"/>
+                        </a:rPr>
+                        <m:t> </m:t>
+                      </m:r>
+                      <m:r>
+                        <a:rPr lang="en-US" sz="2000" i="1" smtClean="0">
+                          <a:solidFill>
+                            <a:schemeClr val="tx1"/>
+                          </a:solidFill>
+                          <a:latin typeface="Cambria Math" panose="02040503050406030204" pitchFamily="18" charset="0"/>
+                        </a:rPr>
+                        <m:t>14.643</m:t>
+                      </m:r>
+                    </m:oMath>
+                  </m:oMathPara>
+                </a14:m>
+                <a:endParaRPr lang="en-US" sz="2000" b="0" i="0" dirty="0">
+                  <a:solidFill>
+                    <a:schemeClr val="tx1"/>
+                  </a:solidFill>
+                  <a:effectLst/>
+                  <a:latin typeface="Segoe WPC"/>
+                </a:endParaRPr>
+              </a:p>
+            </p:txBody>
+          </p:sp>
+        </mc:Choice>
+        <mc:Fallback>
+          <p:sp>
+            <p:nvSpPr>
+              <p:cNvPr id="7" name="TextBox 6">
+                <a:extLst>
+                  <a:ext uri="{FF2B5EF4-FFF2-40B4-BE49-F238E27FC236}">
+                    <a16:creationId xmlns:a16="http://schemas.microsoft.com/office/drawing/2014/main" id="{EB8A59D7-54AE-0350-D906-6E9F85B93FAC}"/>
+                  </a:ext>
+                </a:extLst>
+              </p:cNvPr>
+              <p:cNvSpPr txBox="1">
+                <a:spLocks noRot="1" noChangeAspect="1" noMove="1" noResize="1" noEditPoints="1" noAdjustHandles="1" noChangeArrowheads="1" noChangeShapeType="1" noTextEdit="1"/>
+              </p:cNvSpPr>
+              <p:nvPr/>
+            </p:nvSpPr>
+            <p:spPr>
+              <a:xfrm>
+                <a:off x="4733735" y="6138863"/>
+                <a:ext cx="2724527" cy="400110"/>
+              </a:xfrm>
+              <a:prstGeom prst="rect">
+                <a:avLst/>
+              </a:prstGeom>
+              <a:blipFill>
+                <a:blip r:embed="rId4"/>
+                <a:stretch>
+                  <a:fillRect b="-10606"/>
+                </a:stretch>
+              </a:blipFill>
+            </p:spPr>
+            <p:txBody>
+              <a:bodyPr/>
+              <a:lstStyle/>
+              <a:p>
+                <a:r>
+                  <a:rPr lang="en-US">
+                    <a:noFill/>
+                  </a:rPr>
+                  <a:t> </a:t>
+                </a:r>
+              </a:p>
+            </p:txBody>
+          </p:sp>
+        </mc:Fallback>
+      </mc:AlternateContent>
+    </p:spTree>
+    <p:extLst>
+      <p:ext uri="{BB962C8B-B14F-4D97-AF65-F5344CB8AC3E}">
+        <p14:creationId xmlns:p14="http://schemas.microsoft.com/office/powerpoint/2010/main" val="1363602704"/>
+      </p:ext>
+    </p:extLst>
+  </p:cSld>
+  <p:clrMapOvr>
+    <a:masterClrMapping/>
+  </p:clrMapOvr>
+</p:sld>
+</file>
+
 <file path=ppt/theme/theme1.xml><?xml version="1.0" encoding="utf-8"?>
 <a:theme xmlns:a="http://schemas.openxmlformats.org/drawingml/2006/main" name="Office Theme">
   <a:themeElements>

</xml_diff>

<commit_message>
added data augmentation slide
</commit_message>
<xml_diff>
--- a/Slides_6.pptx
+++ b/Slides_6.pptx
@@ -13,6 +13,7 @@
     <p:sldId id="260" r:id="rId7"/>
     <p:sldId id="261" r:id="rId8"/>
     <p:sldId id="264" r:id="rId9"/>
+    <p:sldId id="265" r:id="rId10"/>
   </p:sldIdLst>
   <p:sldSz cx="12192000" cy="6858000"/>
   <p:notesSz cx="6858000" cy="9144000"/>
@@ -6115,6 +6116,147 @@
 </p:sld>
 </file>
 
+<file path=ppt/slides/slide9.xml><?xml version="1.0" encoding="utf-8"?>
+<p:sld xmlns:a="http://schemas.openxmlformats.org/drawingml/2006/main" xmlns:r="http://schemas.openxmlformats.org/officeDocument/2006/relationships" xmlns:p="http://schemas.openxmlformats.org/presentationml/2006/main">
+  <p:cSld>
+    <p:spTree>
+      <p:nvGrpSpPr>
+        <p:cNvPr id="1" name=""/>
+        <p:cNvGrpSpPr/>
+        <p:nvPr/>
+      </p:nvGrpSpPr>
+      <p:grpSpPr>
+        <a:xfrm>
+          <a:off x="0" y="0"/>
+          <a:ext cx="0" cy="0"/>
+          <a:chOff x="0" y="0"/>
+          <a:chExt cx="0" cy="0"/>
+        </a:xfrm>
+      </p:grpSpPr>
+      <p:sp>
+        <p:nvSpPr>
+          <p:cNvPr id="2" name="Title 1">
+            <a:extLst>
+              <a:ext uri="{FF2B5EF4-FFF2-40B4-BE49-F238E27FC236}">
+                <a16:creationId xmlns:a16="http://schemas.microsoft.com/office/drawing/2014/main" id="{2A0042A4-3BC4-5DB9-A063-CE81FC74B039}"/>
+              </a:ext>
+            </a:extLst>
+          </p:cNvPr>
+          <p:cNvSpPr>
+            <a:spLocks noGrp="1"/>
+          </p:cNvSpPr>
+          <p:nvPr>
+            <p:ph type="title"/>
+          </p:nvPr>
+        </p:nvSpPr>
+        <p:spPr/>
+        <p:txBody>
+          <a:bodyPr/>
+          <a:lstStyle/>
+          <a:p>
+            <a:r>
+              <a:rPr lang="en-US" dirty="0"/>
+              <a:t>Data Augmentation</a:t>
+            </a:r>
+          </a:p>
+        </p:txBody>
+      </p:sp>
+      <p:sp>
+        <p:nvSpPr>
+          <p:cNvPr id="3" name="Content Placeholder 2">
+            <a:extLst>
+              <a:ext uri="{FF2B5EF4-FFF2-40B4-BE49-F238E27FC236}">
+                <a16:creationId xmlns:a16="http://schemas.microsoft.com/office/drawing/2014/main" id="{65998CC8-6297-0262-86BE-0CCA329C18CB}"/>
+              </a:ext>
+            </a:extLst>
+          </p:cNvPr>
+          <p:cNvSpPr>
+            <a:spLocks noGrp="1"/>
+          </p:cNvSpPr>
+          <p:nvPr>
+            <p:ph idx="1"/>
+          </p:nvPr>
+        </p:nvSpPr>
+        <p:spPr>
+          <a:xfrm>
+            <a:off x="838200" y="1825624"/>
+            <a:ext cx="10515600" cy="5032376"/>
+          </a:xfrm>
+        </p:spPr>
+        <p:txBody>
+          <a:bodyPr>
+            <a:normAutofit/>
+          </a:bodyPr>
+          <a:lstStyle/>
+          <a:p>
+            <a:r>
+              <a:rPr lang="en-US" dirty="0"/>
+              <a:t>Flip horizontal / vertical</a:t>
+            </a:r>
+          </a:p>
+          <a:p>
+            <a:r>
+              <a:rPr lang="en-US" dirty="0"/>
+              <a:t>Rotate</a:t>
+            </a:r>
+          </a:p>
+          <a:p>
+            <a:r>
+              <a:rPr lang="en-US" dirty="0"/>
+              <a:t>Rescale</a:t>
+            </a:r>
+          </a:p>
+          <a:p>
+            <a:r>
+              <a:rPr lang="en-US" dirty="0"/>
+              <a:t>Crop</a:t>
+            </a:r>
+          </a:p>
+          <a:p>
+            <a:r>
+              <a:rPr lang="en-US" dirty="0"/>
+              <a:t>Dilate/shrink</a:t>
+            </a:r>
+          </a:p>
+          <a:p>
+            <a:r>
+              <a:rPr lang="en-US" dirty="0"/>
+              <a:t>Add white noise</a:t>
+            </a:r>
+          </a:p>
+          <a:p>
+            <a:r>
+              <a:rPr lang="en-US" dirty="0"/>
+              <a:t>Add salt/pepper noise</a:t>
+            </a:r>
+          </a:p>
+          <a:p>
+            <a:r>
+              <a:rPr lang="en-US" dirty="0"/>
+              <a:t>Add white/black boxes</a:t>
+            </a:r>
+          </a:p>
+          <a:p>
+            <a:r>
+              <a:rPr lang="en-US" dirty="0"/>
+              <a:t>+ anything that you can think of!</a:t>
+            </a:r>
+          </a:p>
+        </p:txBody>
+      </p:sp>
+    </p:spTree>
+    <p:extLst>
+      <p:ext uri="{BB962C8B-B14F-4D97-AF65-F5344CB8AC3E}">
+        <p14:creationId xmlns:p14="http://schemas.microsoft.com/office/powerpoint/2010/main" val="3314343235"/>
+      </p:ext>
+    </p:extLst>
+  </p:cSld>
+  <p:clrMapOvr>
+    <a:masterClrMapping/>
+  </p:clrMapOvr>
+</p:sld>
+</file>
+
 <file path=ppt/theme/theme1.xml><?xml version="1.0" encoding="utf-8"?>
 <a:theme xmlns:a="http://schemas.openxmlformats.org/drawingml/2006/main" name="Office Theme">
   <a:themeElements>

</xml_diff>

<commit_message>
added audio data augmentation
</commit_message>
<xml_diff>
--- a/Slides_6.pptx
+++ b/Slides_6.pptx
@@ -14,6 +14,7 @@
     <p:sldId id="261" r:id="rId8"/>
     <p:sldId id="264" r:id="rId9"/>
     <p:sldId id="265" r:id="rId10"/>
+    <p:sldId id="266" r:id="rId11"/>
   </p:sldIdLst>
   <p:sldSz cx="12192000" cy="6858000"/>
   <p:notesSz cx="6858000" cy="9144000"/>
@@ -3421,6 +3422,112 @@
 </p:sld>
 </file>
 
+<file path=ppt/slides/slide10.xml><?xml version="1.0" encoding="utf-8"?>
+<p:sld xmlns:a="http://schemas.openxmlformats.org/drawingml/2006/main" xmlns:r="http://schemas.openxmlformats.org/officeDocument/2006/relationships" xmlns:p="http://schemas.openxmlformats.org/presentationml/2006/main">
+  <p:cSld>
+    <p:spTree>
+      <p:nvGrpSpPr>
+        <p:cNvPr id="1" name=""/>
+        <p:cNvGrpSpPr/>
+        <p:nvPr/>
+      </p:nvGrpSpPr>
+      <p:grpSpPr>
+        <a:xfrm>
+          <a:off x="0" y="0"/>
+          <a:ext cx="0" cy="0"/>
+          <a:chOff x="0" y="0"/>
+          <a:chExt cx="0" cy="0"/>
+        </a:xfrm>
+      </p:grpSpPr>
+      <p:sp>
+        <p:nvSpPr>
+          <p:cNvPr id="2" name="Title 1">
+            <a:extLst>
+              <a:ext uri="{FF2B5EF4-FFF2-40B4-BE49-F238E27FC236}">
+                <a16:creationId xmlns:a16="http://schemas.microsoft.com/office/drawing/2014/main" id="{2A0042A4-3BC4-5DB9-A063-CE81FC74B039}"/>
+              </a:ext>
+            </a:extLst>
+          </p:cNvPr>
+          <p:cNvSpPr>
+            <a:spLocks noGrp="1"/>
+          </p:cNvSpPr>
+          <p:nvPr>
+            <p:ph type="title"/>
+          </p:nvPr>
+        </p:nvSpPr>
+        <p:spPr/>
+        <p:txBody>
+          <a:bodyPr/>
+          <a:lstStyle/>
+          <a:p>
+            <a:r>
+              <a:rPr lang="en-US" dirty="0"/>
+              <a:t>Data Augmentation: Audio</a:t>
+            </a:r>
+          </a:p>
+        </p:txBody>
+      </p:sp>
+      <p:sp>
+        <p:nvSpPr>
+          <p:cNvPr id="3" name="Content Placeholder 2">
+            <a:extLst>
+              <a:ext uri="{FF2B5EF4-FFF2-40B4-BE49-F238E27FC236}">
+                <a16:creationId xmlns:a16="http://schemas.microsoft.com/office/drawing/2014/main" id="{65998CC8-6297-0262-86BE-0CCA329C18CB}"/>
+              </a:ext>
+            </a:extLst>
+          </p:cNvPr>
+          <p:cNvSpPr>
+            <a:spLocks noGrp="1"/>
+          </p:cNvSpPr>
+          <p:nvPr>
+            <p:ph idx="1"/>
+          </p:nvPr>
+        </p:nvSpPr>
+        <p:spPr/>
+        <p:txBody>
+          <a:bodyPr>
+            <a:normAutofit/>
+          </a:bodyPr>
+          <a:lstStyle/>
+          <a:p>
+            <a:r>
+              <a:rPr lang="en-US" dirty="0"/>
+              <a:t>Add white noise</a:t>
+            </a:r>
+          </a:p>
+          <a:p>
+            <a:r>
+              <a:rPr lang="en-US" dirty="0"/>
+              <a:t>Shifting tone</a:t>
+            </a:r>
+          </a:p>
+          <a:p>
+            <a:r>
+              <a:rPr lang="en-US" dirty="0"/>
+              <a:t>Vary speed</a:t>
+            </a:r>
+          </a:p>
+          <a:p>
+            <a:r>
+              <a:rPr lang="en-US" dirty="0"/>
+              <a:t>Filter frequencies (drop/add low/high frequencies)</a:t>
+            </a:r>
+          </a:p>
+        </p:txBody>
+      </p:sp>
+    </p:spTree>
+    <p:extLst>
+      <p:ext uri="{BB962C8B-B14F-4D97-AF65-F5344CB8AC3E}">
+        <p14:creationId xmlns:p14="http://schemas.microsoft.com/office/powerpoint/2010/main" val="4070658688"/>
+      </p:ext>
+    </p:extLst>
+  </p:cSld>
+  <p:clrMapOvr>
+    <a:masterClrMapping/>
+  </p:clrMapOvr>
+</p:sld>
+</file>
+
 <file path=ppt/slides/slide2.xml><?xml version="1.0" encoding="utf-8"?>
 <p:sld xmlns:a="http://schemas.openxmlformats.org/drawingml/2006/main" xmlns:r="http://schemas.openxmlformats.org/officeDocument/2006/relationships" xmlns:p="http://schemas.openxmlformats.org/presentationml/2006/main">
   <p:cSld>
@@ -6156,7 +6263,7 @@
           <a:p>
             <a:r>
               <a:rPr lang="en-US" dirty="0"/>
-              <a:t>Data Augmentation</a:t>
+              <a:t>Data Augmentation: Images</a:t>
             </a:r>
           </a:p>
         </p:txBody>

</xml_diff>

<commit_message>
added text data augmentation
</commit_message>
<xml_diff>
--- a/Slides_6.pptx
+++ b/Slides_6.pptx
@@ -15,6 +15,7 @@
     <p:sldId id="264" r:id="rId9"/>
     <p:sldId id="265" r:id="rId10"/>
     <p:sldId id="266" r:id="rId11"/>
+    <p:sldId id="267" r:id="rId12"/>
   </p:sldIdLst>
   <p:sldSz cx="12192000" cy="6858000"/>
   <p:notesSz cx="6858000" cy="9144000"/>
@@ -3528,6 +3529,103 @@
 </p:sld>
 </file>
 
+<file path=ppt/slides/slide11.xml><?xml version="1.0" encoding="utf-8"?>
+<p:sld xmlns:a="http://schemas.openxmlformats.org/drawingml/2006/main" xmlns:r="http://schemas.openxmlformats.org/officeDocument/2006/relationships" xmlns:p="http://schemas.openxmlformats.org/presentationml/2006/main">
+  <p:cSld>
+    <p:spTree>
+      <p:nvGrpSpPr>
+        <p:cNvPr id="1" name=""/>
+        <p:cNvGrpSpPr/>
+        <p:nvPr/>
+      </p:nvGrpSpPr>
+      <p:grpSpPr>
+        <a:xfrm>
+          <a:off x="0" y="0"/>
+          <a:ext cx="0" cy="0"/>
+          <a:chOff x="0" y="0"/>
+          <a:chExt cx="0" cy="0"/>
+        </a:xfrm>
+      </p:grpSpPr>
+      <p:sp>
+        <p:nvSpPr>
+          <p:cNvPr id="2" name="Title 1">
+            <a:extLst>
+              <a:ext uri="{FF2B5EF4-FFF2-40B4-BE49-F238E27FC236}">
+                <a16:creationId xmlns:a16="http://schemas.microsoft.com/office/drawing/2014/main" id="{2A0042A4-3BC4-5DB9-A063-CE81FC74B039}"/>
+              </a:ext>
+            </a:extLst>
+          </p:cNvPr>
+          <p:cNvSpPr>
+            <a:spLocks noGrp="1"/>
+          </p:cNvSpPr>
+          <p:nvPr>
+            <p:ph type="title"/>
+          </p:nvPr>
+        </p:nvSpPr>
+        <p:spPr/>
+        <p:txBody>
+          <a:bodyPr/>
+          <a:lstStyle/>
+          <a:p>
+            <a:r>
+              <a:rPr lang="en-US" dirty="0"/>
+              <a:t>Data Augmentation: Text</a:t>
+            </a:r>
+          </a:p>
+        </p:txBody>
+      </p:sp>
+      <p:sp>
+        <p:nvSpPr>
+          <p:cNvPr id="3" name="Content Placeholder 2">
+            <a:extLst>
+              <a:ext uri="{FF2B5EF4-FFF2-40B4-BE49-F238E27FC236}">
+                <a16:creationId xmlns:a16="http://schemas.microsoft.com/office/drawing/2014/main" id="{65998CC8-6297-0262-86BE-0CCA329C18CB}"/>
+              </a:ext>
+            </a:extLst>
+          </p:cNvPr>
+          <p:cNvSpPr>
+            <a:spLocks noGrp="1"/>
+          </p:cNvSpPr>
+          <p:nvPr>
+            <p:ph idx="1"/>
+          </p:nvPr>
+        </p:nvSpPr>
+        <p:spPr/>
+        <p:txBody>
+          <a:bodyPr>
+            <a:normAutofit/>
+          </a:bodyPr>
+          <a:lstStyle/>
+          <a:p>
+            <a:r>
+              <a:rPr lang="en-US" dirty="0"/>
+              <a:t>Synonym substitute</a:t>
+            </a:r>
+          </a:p>
+          <a:p>
+            <a:r>
+              <a:rPr lang="en-US" dirty="0"/>
+              <a:t>Random insertion</a:t>
+            </a:r>
+          </a:p>
+          <a:p>
+            <a:endParaRPr lang="en-US" dirty="0"/>
+          </a:p>
+        </p:txBody>
+      </p:sp>
+    </p:spTree>
+    <p:extLst>
+      <p:ext uri="{BB962C8B-B14F-4D97-AF65-F5344CB8AC3E}">
+        <p14:creationId xmlns:p14="http://schemas.microsoft.com/office/powerpoint/2010/main" val="3274120912"/>
+      </p:ext>
+    </p:extLst>
+  </p:cSld>
+  <p:clrMapOvr>
+    <a:masterClrMapping/>
+  </p:clrMapOvr>
+</p:sld>
+</file>
+
 <file path=ppt/slides/slide2.xml><?xml version="1.0" encoding="utf-8"?>
 <p:sld xmlns:a="http://schemas.openxmlformats.org/drawingml/2006/main" xmlns:r="http://schemas.openxmlformats.org/officeDocument/2006/relationships" xmlns:p="http://schemas.openxmlformats.org/presentationml/2006/main">
   <p:cSld>

</xml_diff>

<commit_message>
imbalanced data def slide
</commit_message>
<xml_diff>
--- a/Slides_6.pptx
+++ b/Slides_6.pptx
@@ -4014,12 +4014,40 @@
           </a:p>
         </p:txBody>
       </p:sp>
+      <p:sp>
+        <p:nvSpPr>
+          <p:cNvPr id="9" name="Text Placeholder 8">
+            <a:extLst>
+              <a:ext uri="{FF2B5EF4-FFF2-40B4-BE49-F238E27FC236}">
+                <a16:creationId xmlns:a16="http://schemas.microsoft.com/office/drawing/2014/main" id="{3FD00515-5CBA-624C-430E-00C5B1534EF4}"/>
+              </a:ext>
+            </a:extLst>
+          </p:cNvPr>
+          <p:cNvSpPr>
+            <a:spLocks noGrp="1"/>
+          </p:cNvSpPr>
+          <p:nvPr>
+            <p:ph type="body" idx="1"/>
+          </p:nvPr>
+        </p:nvSpPr>
+        <p:spPr/>
+        <p:txBody>
+          <a:bodyPr/>
+          <a:lstStyle/>
+          <a:p>
+            <a:r>
+              <a:rPr lang="en-US" dirty="0"/>
+              <a:t>Binary</a:t>
+            </a:r>
+          </a:p>
+        </p:txBody>
+      </p:sp>
       <p:pic>
         <p:nvPicPr>
-          <p:cNvPr id="5" name="Content Placeholder 4">
-            <a:extLst>
-              <a:ext uri="{FF2B5EF4-FFF2-40B4-BE49-F238E27FC236}">
-                <a16:creationId xmlns:a16="http://schemas.microsoft.com/office/drawing/2014/main" id="{8520206D-EE03-7A5A-85A7-BB1EA249ED57}"/>
+          <p:cNvPr id="14" name="Content Placeholder 13">
+            <a:extLst>
+              <a:ext uri="{FF2B5EF4-FFF2-40B4-BE49-F238E27FC236}">
+                <a16:creationId xmlns:a16="http://schemas.microsoft.com/office/drawing/2014/main" id="{72A1C494-F1C1-54A9-CE13-AB51DC212163}"/>
               </a:ext>
             </a:extLst>
           </p:cNvPr>
@@ -4027,7 +4055,7 @@
             <a:picLocks noGrp="1" noChangeAspect="1"/>
           </p:cNvPicPr>
           <p:nvPr>
-            <p:ph sz="half" idx="1"/>
+            <p:ph sz="half" idx="2"/>
           </p:nvPr>
         </p:nvPicPr>
         <p:blipFill>
@@ -4047,25 +4075,25 @@
         </p:blipFill>
         <p:spPr>
           <a:xfrm>
-            <a:off x="838200" y="2266950"/>
-            <a:ext cx="4840110" cy="3000374"/>
+            <a:off x="839788" y="2798161"/>
+            <a:ext cx="5157787" cy="3098416"/>
           </a:xfrm>
         </p:spPr>
       </p:pic>
       <p:sp>
         <p:nvSpPr>
-          <p:cNvPr id="6" name="Content Placeholder 5">
-            <a:extLst>
-              <a:ext uri="{FF2B5EF4-FFF2-40B4-BE49-F238E27FC236}">
-                <a16:creationId xmlns:a16="http://schemas.microsoft.com/office/drawing/2014/main" id="{DDA802A5-D5EC-06A0-460D-57536E4DEF2F}"/>
-              </a:ext>
-            </a:extLst>
-          </p:cNvPr>
-          <p:cNvSpPr>
-            <a:spLocks noGrp="1"/>
-          </p:cNvSpPr>
-          <p:nvPr>
-            <p:ph sz="half" idx="2"/>
+          <p:cNvPr id="11" name="Text Placeholder 10">
+            <a:extLst>
+              <a:ext uri="{FF2B5EF4-FFF2-40B4-BE49-F238E27FC236}">
+                <a16:creationId xmlns:a16="http://schemas.microsoft.com/office/drawing/2014/main" id="{D3706D7C-265B-5F49-D1C2-C4D58C4A7BC6}"/>
+              </a:ext>
+            </a:extLst>
+          </p:cNvPr>
+          <p:cNvSpPr>
+            <a:spLocks noGrp="1"/>
+          </p:cNvSpPr>
+          <p:nvPr>
+            <p:ph type="body" sz="quarter" idx="3"/>
           </p:nvPr>
         </p:nvSpPr>
         <p:spPr/>
@@ -4073,53 +4101,51 @@
           <a:bodyPr/>
           <a:lstStyle/>
           <a:p>
-            <a:pPr marL="0" indent="0">
-              <a:buNone/>
-            </a:pPr>
             <a:r>
               <a:rPr lang="en-US" dirty="0"/>
-              <a:t>Data-level:</a:t>
-            </a:r>
-          </a:p>
-          <a:p>
-            <a:r>
-              <a:rPr lang="en-US" dirty="0"/>
-              <a:t>Over sampling / Under sampling</a:t>
-            </a:r>
-          </a:p>
-          <a:p>
-            <a:r>
-              <a:rPr lang="en-US" dirty="0"/>
-              <a:t>Synthetic data generation</a:t>
-            </a:r>
-          </a:p>
-          <a:p>
-            <a:pPr marL="0" indent="0">
-              <a:buNone/>
-            </a:pPr>
-            <a:endParaRPr lang="en-US" dirty="0"/>
-          </a:p>
-          <a:p>
-            <a:pPr marL="0" indent="0">
-              <a:buNone/>
-            </a:pPr>
-            <a:r>
-              <a:rPr lang="en-US" dirty="0"/>
-              <a:t>Algorithm-level</a:t>
-            </a:r>
-          </a:p>
-          <a:p>
-            <a:r>
-              <a:rPr lang="en-US" dirty="0"/>
-              <a:t>Cost-sensitive learning / Class weight adjustment</a:t>
-            </a:r>
-          </a:p>
-          <a:p>
-            <a:pPr lvl="1"/>
-            <a:endParaRPr lang="en-US" dirty="0"/>
-          </a:p>
-        </p:txBody>
-      </p:sp>
+              <a:t>Non-Binary</a:t>
+            </a:r>
+          </a:p>
+        </p:txBody>
+      </p:sp>
+      <p:pic>
+        <p:nvPicPr>
+          <p:cNvPr id="16" name="Content Placeholder 15">
+            <a:extLst>
+              <a:ext uri="{FF2B5EF4-FFF2-40B4-BE49-F238E27FC236}">
+                <a16:creationId xmlns:a16="http://schemas.microsoft.com/office/drawing/2014/main" id="{CE0CCB1B-25AE-B0A7-C5DE-0B0F68E8375B}"/>
+              </a:ext>
+            </a:extLst>
+          </p:cNvPr>
+          <p:cNvPicPr>
+            <a:picLocks noGrp="1" noChangeAspect="1"/>
+          </p:cNvPicPr>
+          <p:nvPr>
+            <p:ph sz="quarter" idx="4"/>
+          </p:nvPr>
+        </p:nvPicPr>
+        <p:blipFill>
+          <a:blip r:embed="rId4">
+            <a:extLst>
+              <a:ext uri="{28A0092B-C50C-407E-A947-70E740481C1C}">
+                <a14:useLocalDpi xmlns:a14="http://schemas.microsoft.com/office/drawing/2010/main" val="0"/>
+              </a:ext>
+              <a:ext uri="{96DAC541-7B7A-43D3-8B79-37D633B846F1}">
+                <asvg:svgBlip xmlns:asvg="http://schemas.microsoft.com/office/drawing/2016/SVG/main" r:embed="rId5"/>
+              </a:ext>
+            </a:extLst>
+          </a:blip>
+          <a:stretch>
+            <a:fillRect/>
+          </a:stretch>
+        </p:blipFill>
+        <p:spPr>
+          <a:xfrm>
+            <a:off x="6172200" y="2789589"/>
+            <a:ext cx="5183188" cy="3115560"/>
+          </a:xfrm>
+        </p:spPr>
+      </p:pic>
     </p:spTree>
     <p:extLst>
       <p:ext uri="{BB962C8B-B14F-4D97-AF65-F5344CB8AC3E}">
@@ -4173,7 +4199,7 @@
           <a:p>
             <a:r>
               <a:rPr lang="en-US" dirty="0"/>
-              <a:t>Imbalanced Data: Metrics</a:t>
+              <a:t>Imbalanced Data: Binary Metrics</a:t>
             </a:r>
           </a:p>
         </p:txBody>

</xml_diff>